<commit_message>
Sugestoes Pos Defesa - Vitor
</commit_message>
<xml_diff>
--- a/figs/materiais_metodo/autovalores_com_ga/fluxo.pptx
+++ b/figs/materiais_metodo/autovalores_com_ga/fluxo.pptx
@@ -291,7 +291,7 @@
             <a:fld id="{FA4210BE-62A0-433C-B55F-C3FDBCE501B1}" type="datetimeFigureOut">
               <a:rPr lang="pt-BR" smtClean="0"/>
               <a:pPr/>
-              <a:t>02/01/2016</a:t>
+              <a:t>11/04/2016</a:t>
             </a:fld>
             <a:endParaRPr lang="pt-BR"/>
           </a:p>
@@ -458,7 +458,7 @@
             <a:fld id="{FA4210BE-62A0-433C-B55F-C3FDBCE501B1}" type="datetimeFigureOut">
               <a:rPr lang="pt-BR" smtClean="0"/>
               <a:pPr/>
-              <a:t>02/01/2016</a:t>
+              <a:t>11/04/2016</a:t>
             </a:fld>
             <a:endParaRPr lang="pt-BR"/>
           </a:p>
@@ -635,7 +635,7 @@
             <a:fld id="{FA4210BE-62A0-433C-B55F-C3FDBCE501B1}" type="datetimeFigureOut">
               <a:rPr lang="pt-BR" smtClean="0"/>
               <a:pPr/>
-              <a:t>02/01/2016</a:t>
+              <a:t>11/04/2016</a:t>
             </a:fld>
             <a:endParaRPr lang="pt-BR"/>
           </a:p>
@@ -802,7 +802,7 @@
             <a:fld id="{FA4210BE-62A0-433C-B55F-C3FDBCE501B1}" type="datetimeFigureOut">
               <a:rPr lang="pt-BR" smtClean="0"/>
               <a:pPr/>
-              <a:t>02/01/2016</a:t>
+              <a:t>11/04/2016</a:t>
             </a:fld>
             <a:endParaRPr lang="pt-BR"/>
           </a:p>
@@ -1045,7 +1045,7 @@
             <a:fld id="{FA4210BE-62A0-433C-B55F-C3FDBCE501B1}" type="datetimeFigureOut">
               <a:rPr lang="pt-BR" smtClean="0"/>
               <a:pPr/>
-              <a:t>02/01/2016</a:t>
+              <a:t>11/04/2016</a:t>
             </a:fld>
             <a:endParaRPr lang="pt-BR"/>
           </a:p>
@@ -1330,7 +1330,7 @@
             <a:fld id="{FA4210BE-62A0-433C-B55F-C3FDBCE501B1}" type="datetimeFigureOut">
               <a:rPr lang="pt-BR" smtClean="0"/>
               <a:pPr/>
-              <a:t>02/01/2016</a:t>
+              <a:t>11/04/2016</a:t>
             </a:fld>
             <a:endParaRPr lang="pt-BR"/>
           </a:p>
@@ -1749,7 +1749,7 @@
             <a:fld id="{FA4210BE-62A0-433C-B55F-C3FDBCE501B1}" type="datetimeFigureOut">
               <a:rPr lang="pt-BR" smtClean="0"/>
               <a:pPr/>
-              <a:t>02/01/2016</a:t>
+              <a:t>11/04/2016</a:t>
             </a:fld>
             <a:endParaRPr lang="pt-BR"/>
           </a:p>
@@ -1864,7 +1864,7 @@
             <a:fld id="{FA4210BE-62A0-433C-B55F-C3FDBCE501B1}" type="datetimeFigureOut">
               <a:rPr lang="pt-BR" smtClean="0"/>
               <a:pPr/>
-              <a:t>02/01/2016</a:t>
+              <a:t>11/04/2016</a:t>
             </a:fld>
             <a:endParaRPr lang="pt-BR"/>
           </a:p>
@@ -1956,7 +1956,7 @@
             <a:fld id="{FA4210BE-62A0-433C-B55F-C3FDBCE501B1}" type="datetimeFigureOut">
               <a:rPr lang="pt-BR" smtClean="0"/>
               <a:pPr/>
-              <a:t>02/01/2016</a:t>
+              <a:t>11/04/2016</a:t>
             </a:fld>
             <a:endParaRPr lang="pt-BR"/>
           </a:p>
@@ -2230,7 +2230,7 @@
             <a:fld id="{FA4210BE-62A0-433C-B55F-C3FDBCE501B1}" type="datetimeFigureOut">
               <a:rPr lang="pt-BR" smtClean="0"/>
               <a:pPr/>
-              <a:t>02/01/2016</a:t>
+              <a:t>11/04/2016</a:t>
             </a:fld>
             <a:endParaRPr lang="pt-BR"/>
           </a:p>
@@ -2480,7 +2480,7 @@
             <a:fld id="{FA4210BE-62A0-433C-B55F-C3FDBCE501B1}" type="datetimeFigureOut">
               <a:rPr lang="pt-BR" smtClean="0"/>
               <a:pPr/>
-              <a:t>02/01/2016</a:t>
+              <a:t>11/04/2016</a:t>
             </a:fld>
             <a:endParaRPr lang="pt-BR"/>
           </a:p>
@@ -2690,7 +2690,7 @@
             <a:fld id="{FA4210BE-62A0-433C-B55F-C3FDBCE501B1}" type="datetimeFigureOut">
               <a:rPr lang="pt-BR" smtClean="0"/>
               <a:pPr/>
-              <a:t>02/01/2016</a:t>
+              <a:t>11/04/2016</a:t>
             </a:fld>
             <a:endParaRPr lang="pt-BR"/>
           </a:p>
@@ -3969,7 +3969,7 @@
       </p:sp>
       <p:pic>
         <p:nvPicPr>
-          <p:cNvPr id="1026" name="Picture 2"/>
+          <p:cNvPr id="1028" name="Picture 4"/>
           <p:cNvPicPr>
             <a:picLocks noChangeAspect="1" noChangeArrowheads="1"/>
           </p:cNvPicPr>
@@ -3986,8 +3986,8 @@
         </p:blipFill>
         <p:spPr bwMode="auto">
           <a:xfrm>
-            <a:off x="3563887" y="1628800"/>
-            <a:ext cx="2100645" cy="432048"/>
+            <a:off x="3563887" y="2564904"/>
+            <a:ext cx="1584176" cy="526212"/>
           </a:xfrm>
           <a:prstGeom prst="rect">
             <a:avLst/>
@@ -4005,7 +4005,115 @@
       </p:pic>
       <p:pic>
         <p:nvPicPr>
-          <p:cNvPr id="1028" name="Picture 4"/>
+          <p:cNvPr id="23" name="Picture 4"/>
+          <p:cNvPicPr>
+            <a:picLocks noChangeAspect="1" noChangeArrowheads="1"/>
+          </p:cNvPicPr>
+          <p:nvPr/>
+        </p:nvPicPr>
+        <p:blipFill>
+          <a:blip r:embed="rId2" cstate="print">
+            <a:lum bright="-20000" contrast="40000"/>
+          </a:blip>
+          <a:srcRect/>
+          <a:stretch>
+            <a:fillRect/>
+          </a:stretch>
+        </p:blipFill>
+        <p:spPr bwMode="auto">
+          <a:xfrm>
+            <a:off x="3563887" y="3645024"/>
+            <a:ext cx="1584176" cy="526212"/>
+          </a:xfrm>
+          <a:prstGeom prst="rect">
+            <a:avLst/>
+          </a:prstGeom>
+          <a:noFill/>
+          <a:ln w="12700">
+            <a:solidFill>
+              <a:schemeClr val="tx1"/>
+            </a:solidFill>
+            <a:miter lim="800000"/>
+            <a:headEnd/>
+            <a:tailEnd/>
+          </a:ln>
+        </p:spPr>
+      </p:pic>
+      <p:cxnSp>
+        <p:nvCxnSpPr>
+          <p:cNvPr id="27" name="Conector reto 26"/>
+          <p:cNvCxnSpPr/>
+          <p:nvPr/>
+        </p:nvCxnSpPr>
+        <p:spPr>
+          <a:xfrm>
+            <a:off x="4559300" y="3670424"/>
+            <a:ext cx="0" cy="468000"/>
+          </a:xfrm>
+          <a:prstGeom prst="line">
+            <a:avLst/>
+          </a:prstGeom>
+          <a:ln w="19050">
+            <a:solidFill>
+              <a:schemeClr val="tx1"/>
+            </a:solidFill>
+            <a:prstDash val="solid"/>
+          </a:ln>
+        </p:spPr>
+        <p:style>
+          <a:lnRef idx="1">
+            <a:schemeClr val="accent1"/>
+          </a:lnRef>
+          <a:fillRef idx="0">
+            <a:schemeClr val="accent1"/>
+          </a:fillRef>
+          <a:effectRef idx="0">
+            <a:schemeClr val="accent1"/>
+          </a:effectRef>
+          <a:fontRef idx="minor">
+            <a:schemeClr val="tx1"/>
+          </a:fontRef>
+        </p:style>
+      </p:cxnSp>
+      <p:cxnSp>
+        <p:nvCxnSpPr>
+          <p:cNvPr id="28" name="Conector reto 27"/>
+          <p:cNvCxnSpPr/>
+          <p:nvPr/>
+        </p:nvCxnSpPr>
+        <p:spPr>
+          <a:xfrm>
+            <a:off x="4741416" y="3670424"/>
+            <a:ext cx="0" cy="468000"/>
+          </a:xfrm>
+          <a:prstGeom prst="line">
+            <a:avLst/>
+          </a:prstGeom>
+          <a:ln w="19050">
+            <a:solidFill>
+              <a:schemeClr val="tx1"/>
+            </a:solidFill>
+            <a:prstDash val="solid"/>
+          </a:ln>
+        </p:spPr>
+        <p:style>
+          <a:lnRef idx="1">
+            <a:schemeClr val="accent1"/>
+          </a:lnRef>
+          <a:fillRef idx="0">
+            <a:schemeClr val="accent1"/>
+          </a:fillRef>
+          <a:effectRef idx="0">
+            <a:schemeClr val="accent1"/>
+          </a:effectRef>
+          <a:fontRef idx="minor">
+            <a:schemeClr val="tx1"/>
+          </a:fontRef>
+        </p:style>
+      </p:cxnSp>
+      <p:pic>
+        <p:nvPicPr>
+          <p:cNvPr id="1029" name="Picture 5"/>
           <p:cNvPicPr>
             <a:picLocks noChangeAspect="1" noChangeArrowheads="1"/>
           </p:cNvPicPr>
@@ -4022,8 +4130,8 @@
         </p:blipFill>
         <p:spPr bwMode="auto">
           <a:xfrm>
-            <a:off x="3563887" y="2564904"/>
-            <a:ext cx="1584176" cy="526212"/>
+            <a:off x="3563887" y="4869160"/>
+            <a:ext cx="1584000" cy="248044"/>
           </a:xfrm>
           <a:prstGeom prst="rect">
             <a:avLst/>
@@ -4041,115 +4149,7 @@
       </p:pic>
       <p:pic>
         <p:nvPicPr>
-          <p:cNvPr id="23" name="Picture 4"/>
-          <p:cNvPicPr>
-            <a:picLocks noChangeAspect="1" noChangeArrowheads="1"/>
-          </p:cNvPicPr>
-          <p:nvPr/>
-        </p:nvPicPr>
-        <p:blipFill>
-          <a:blip r:embed="rId3" cstate="print">
-            <a:lum bright="-20000" contrast="40000"/>
-          </a:blip>
-          <a:srcRect/>
-          <a:stretch>
-            <a:fillRect/>
-          </a:stretch>
-        </p:blipFill>
-        <p:spPr bwMode="auto">
-          <a:xfrm>
-            <a:off x="3563887" y="3645024"/>
-            <a:ext cx="1584176" cy="526212"/>
-          </a:xfrm>
-          <a:prstGeom prst="rect">
-            <a:avLst/>
-          </a:prstGeom>
-          <a:noFill/>
-          <a:ln w="12700">
-            <a:solidFill>
-              <a:schemeClr val="tx1"/>
-            </a:solidFill>
-            <a:miter lim="800000"/>
-            <a:headEnd/>
-            <a:tailEnd/>
-          </a:ln>
-        </p:spPr>
-      </p:pic>
-      <p:cxnSp>
-        <p:nvCxnSpPr>
-          <p:cNvPr id="27" name="Conector reto 26"/>
-          <p:cNvCxnSpPr/>
-          <p:nvPr/>
-        </p:nvCxnSpPr>
-        <p:spPr>
-          <a:xfrm>
-            <a:off x="4559300" y="3670424"/>
-            <a:ext cx="0" cy="468000"/>
-          </a:xfrm>
-          <a:prstGeom prst="line">
-            <a:avLst/>
-          </a:prstGeom>
-          <a:ln w="19050">
-            <a:solidFill>
-              <a:schemeClr val="tx1"/>
-            </a:solidFill>
-            <a:prstDash val="solid"/>
-          </a:ln>
-        </p:spPr>
-        <p:style>
-          <a:lnRef idx="1">
-            <a:schemeClr val="accent1"/>
-          </a:lnRef>
-          <a:fillRef idx="0">
-            <a:schemeClr val="accent1"/>
-          </a:fillRef>
-          <a:effectRef idx="0">
-            <a:schemeClr val="accent1"/>
-          </a:effectRef>
-          <a:fontRef idx="minor">
-            <a:schemeClr val="tx1"/>
-          </a:fontRef>
-        </p:style>
-      </p:cxnSp>
-      <p:cxnSp>
-        <p:nvCxnSpPr>
-          <p:cNvPr id="28" name="Conector reto 27"/>
-          <p:cNvCxnSpPr/>
-          <p:nvPr/>
-        </p:nvCxnSpPr>
-        <p:spPr>
-          <a:xfrm>
-            <a:off x="4741416" y="3670424"/>
-            <a:ext cx="0" cy="468000"/>
-          </a:xfrm>
-          <a:prstGeom prst="line">
-            <a:avLst/>
-          </a:prstGeom>
-          <a:ln w="19050">
-            <a:solidFill>
-              <a:schemeClr val="tx1"/>
-            </a:solidFill>
-            <a:prstDash val="solid"/>
-          </a:ln>
-        </p:spPr>
-        <p:style>
-          <a:lnRef idx="1">
-            <a:schemeClr val="accent1"/>
-          </a:lnRef>
-          <a:fillRef idx="0">
-            <a:schemeClr val="accent1"/>
-          </a:fillRef>
-          <a:effectRef idx="0">
-            <a:schemeClr val="accent1"/>
-          </a:effectRef>
-          <a:fontRef idx="minor">
-            <a:schemeClr val="tx1"/>
-          </a:fontRef>
-        </p:style>
-      </p:cxnSp>
-      <p:pic>
-        <p:nvPicPr>
-          <p:cNvPr id="1029" name="Picture 5"/>
+          <p:cNvPr id="1031" name="Picture 7"/>
           <p:cNvPicPr>
             <a:picLocks noChangeAspect="1" noChangeArrowheads="1"/>
           </p:cNvPicPr>
@@ -4166,8 +4166,8 @@
         </p:blipFill>
         <p:spPr bwMode="auto">
           <a:xfrm>
-            <a:off x="3563887" y="4869160"/>
-            <a:ext cx="1584000" cy="248044"/>
+            <a:off x="6012160" y="3284984"/>
+            <a:ext cx="1095375" cy="600075"/>
           </a:xfrm>
           <a:prstGeom prst="rect">
             <a:avLst/>
@@ -4183,9 +4183,55 @@
           </a:ln>
         </p:spPr>
       </p:pic>
+      <p:sp>
+        <p:nvSpPr>
+          <p:cNvPr id="33" name="Retângulo 32"/>
+          <p:cNvSpPr/>
+          <p:nvPr/>
+        </p:nvSpPr>
+        <p:spPr>
+          <a:xfrm>
+            <a:off x="4211960" y="4941168"/>
+            <a:ext cx="288032" cy="144016"/>
+          </a:xfrm>
+          <a:prstGeom prst="rect">
+            <a:avLst/>
+          </a:prstGeom>
+          <a:noFill/>
+          <a:ln>
+            <a:solidFill>
+              <a:schemeClr val="tx1"/>
+            </a:solidFill>
+          </a:ln>
+        </p:spPr>
+        <p:style>
+          <a:lnRef idx="2">
+            <a:schemeClr val="accent1">
+              <a:shade val="50000"/>
+            </a:schemeClr>
+          </a:lnRef>
+          <a:fillRef idx="1">
+            <a:schemeClr val="accent1"/>
+          </a:fillRef>
+          <a:effectRef idx="0">
+            <a:schemeClr val="accent1"/>
+          </a:effectRef>
+          <a:fontRef idx="minor">
+            <a:schemeClr val="lt1"/>
+          </a:fontRef>
+        </p:style>
+        <p:txBody>
+          <a:bodyPr rtlCol="0" anchor="ctr"/>
+          <a:lstStyle/>
+          <a:p>
+            <a:pPr algn="ctr"/>
+            <a:endParaRPr lang="pt-BR"/>
+          </a:p>
+        </p:txBody>
+      </p:sp>
       <p:pic>
         <p:nvPicPr>
-          <p:cNvPr id="1031" name="Picture 7"/>
+          <p:cNvPr id="2" name="Picture 2"/>
           <p:cNvPicPr>
             <a:picLocks noChangeAspect="1" noChangeArrowheads="1"/>
           </p:cNvPicPr>
@@ -4202,8 +4248,8 @@
         </p:blipFill>
         <p:spPr bwMode="auto">
           <a:xfrm>
-            <a:off x="6012160" y="3284984"/>
-            <a:ext cx="1095375" cy="600075"/>
+            <a:off x="3563887" y="1628800"/>
+            <a:ext cx="2160240" cy="442214"/>
           </a:xfrm>
           <a:prstGeom prst="rect">
             <a:avLst/>
@@ -4219,52 +4265,6 @@
           </a:ln>
         </p:spPr>
       </p:pic>
-      <p:sp>
-        <p:nvSpPr>
-          <p:cNvPr id="33" name="Retângulo 32"/>
-          <p:cNvSpPr/>
-          <p:nvPr/>
-        </p:nvSpPr>
-        <p:spPr>
-          <a:xfrm>
-            <a:off x="4211960" y="4941168"/>
-            <a:ext cx="288032" cy="144016"/>
-          </a:xfrm>
-          <a:prstGeom prst="rect">
-            <a:avLst/>
-          </a:prstGeom>
-          <a:noFill/>
-          <a:ln>
-            <a:solidFill>
-              <a:schemeClr val="tx1"/>
-            </a:solidFill>
-          </a:ln>
-        </p:spPr>
-        <p:style>
-          <a:lnRef idx="2">
-            <a:schemeClr val="accent1">
-              <a:shade val="50000"/>
-            </a:schemeClr>
-          </a:lnRef>
-          <a:fillRef idx="1">
-            <a:schemeClr val="accent1"/>
-          </a:fillRef>
-          <a:effectRef idx="0">
-            <a:schemeClr val="accent1"/>
-          </a:effectRef>
-          <a:fontRef idx="minor">
-            <a:schemeClr val="lt1"/>
-          </a:fontRef>
-        </p:style>
-        <p:txBody>
-          <a:bodyPr rtlCol="0" anchor="ctr"/>
-          <a:lstStyle/>
-          <a:p>
-            <a:pPr algn="ctr"/>
-            <a:endParaRPr lang="pt-BR"/>
-          </a:p>
-        </p:txBody>
-      </p:sp>
     </p:spTree>
   </p:cSld>
   <p:clrMapOvr>

</xml_diff>